<commit_message>
New requirement info & test drawing added
</commit_message>
<xml_diff>
--- a/Documentation/ReleaseNotes.pptx
+++ b/Documentation/ReleaseNotes.pptx
@@ -106,6 +106,11 @@
       </a:defRPr>
     </a:lvl9pPr>
   </p:defaultTextStyle>
+  <p:extLst>
+    <p:ext uri="{EFAFB233-063F-42B5-8137-9DF3F51BA10A}">
+      <p15:sldGuideLst xmlns:p15="http://schemas.microsoft.com/office/powerpoint/2012/main"/>
+    </p:ext>
+  </p:extLst>
 </p:presentation>
 </file>
 
@@ -258,7 +263,7 @@
           <a:p>
             <a:fld id="{84A20A80-CBDF-41E9-A8D1-A3156D53D4CF}" type="datetimeFigureOut">
               <a:rPr lang="en-IN" smtClean="0"/>
-              <a:t>24-08-2024</a:t>
+              <a:t>31-08-2024</a:t>
             </a:fld>
             <a:endParaRPr lang="en-IN"/>
           </a:p>
@@ -458,7 +463,7 @@
           <a:p>
             <a:fld id="{84A20A80-CBDF-41E9-A8D1-A3156D53D4CF}" type="datetimeFigureOut">
               <a:rPr lang="en-IN" smtClean="0"/>
-              <a:t>24-08-2024</a:t>
+              <a:t>31-08-2024</a:t>
             </a:fld>
             <a:endParaRPr lang="en-IN"/>
           </a:p>
@@ -668,7 +673,7 @@
           <a:p>
             <a:fld id="{84A20A80-CBDF-41E9-A8D1-A3156D53D4CF}" type="datetimeFigureOut">
               <a:rPr lang="en-IN" smtClean="0"/>
-              <a:t>24-08-2024</a:t>
+              <a:t>31-08-2024</a:t>
             </a:fld>
             <a:endParaRPr lang="en-IN"/>
           </a:p>
@@ -868,7 +873,7 @@
           <a:p>
             <a:fld id="{84A20A80-CBDF-41E9-A8D1-A3156D53D4CF}" type="datetimeFigureOut">
               <a:rPr lang="en-IN" smtClean="0"/>
-              <a:t>24-08-2024</a:t>
+              <a:t>31-08-2024</a:t>
             </a:fld>
             <a:endParaRPr lang="en-IN"/>
           </a:p>
@@ -1144,7 +1149,7 @@
           <a:p>
             <a:fld id="{84A20A80-CBDF-41E9-A8D1-A3156D53D4CF}" type="datetimeFigureOut">
               <a:rPr lang="en-IN" smtClean="0"/>
-              <a:t>24-08-2024</a:t>
+              <a:t>31-08-2024</a:t>
             </a:fld>
             <a:endParaRPr lang="en-IN"/>
           </a:p>
@@ -1412,7 +1417,7 @@
           <a:p>
             <a:fld id="{84A20A80-CBDF-41E9-A8D1-A3156D53D4CF}" type="datetimeFigureOut">
               <a:rPr lang="en-IN" smtClean="0"/>
-              <a:t>24-08-2024</a:t>
+              <a:t>31-08-2024</a:t>
             </a:fld>
             <a:endParaRPr lang="en-IN"/>
           </a:p>
@@ -1827,7 +1832,7 @@
           <a:p>
             <a:fld id="{84A20A80-CBDF-41E9-A8D1-A3156D53D4CF}" type="datetimeFigureOut">
               <a:rPr lang="en-IN" smtClean="0"/>
-              <a:t>24-08-2024</a:t>
+              <a:t>31-08-2024</a:t>
             </a:fld>
             <a:endParaRPr lang="en-IN"/>
           </a:p>
@@ -1969,7 +1974,7 @@
           <a:p>
             <a:fld id="{84A20A80-CBDF-41E9-A8D1-A3156D53D4CF}" type="datetimeFigureOut">
               <a:rPr lang="en-IN" smtClean="0"/>
-              <a:t>24-08-2024</a:t>
+              <a:t>31-08-2024</a:t>
             </a:fld>
             <a:endParaRPr lang="en-IN"/>
           </a:p>
@@ -2082,7 +2087,7 @@
           <a:p>
             <a:fld id="{84A20A80-CBDF-41E9-A8D1-A3156D53D4CF}" type="datetimeFigureOut">
               <a:rPr lang="en-IN" smtClean="0"/>
-              <a:t>24-08-2024</a:t>
+              <a:t>31-08-2024</a:t>
             </a:fld>
             <a:endParaRPr lang="en-IN"/>
           </a:p>
@@ -2395,7 +2400,7 @@
           <a:p>
             <a:fld id="{84A20A80-CBDF-41E9-A8D1-A3156D53D4CF}" type="datetimeFigureOut">
               <a:rPr lang="en-IN" smtClean="0"/>
-              <a:t>24-08-2024</a:t>
+              <a:t>31-08-2024</a:t>
             </a:fld>
             <a:endParaRPr lang="en-IN"/>
           </a:p>
@@ -2684,7 +2689,7 @@
           <a:p>
             <a:fld id="{84A20A80-CBDF-41E9-A8D1-A3156D53D4CF}" type="datetimeFigureOut">
               <a:rPr lang="en-IN" smtClean="0"/>
-              <a:t>24-08-2024</a:t>
+              <a:t>31-08-2024</a:t>
             </a:fld>
             <a:endParaRPr lang="en-IN"/>
           </a:p>
@@ -2927,7 +2932,7 @@
           <a:p>
             <a:fld id="{84A20A80-CBDF-41E9-A8D1-A3156D53D4CF}" type="datetimeFigureOut">
               <a:rPr lang="en-IN" smtClean="0"/>
-              <a:t>24-08-2024</a:t>
+              <a:t>31-08-2024</a:t>
             </a:fld>
             <a:endParaRPr lang="en-IN"/>
           </a:p>
@@ -3631,12 +3636,12 @@
                     <a:p>
                       <a:pPr algn="l" fontAlgn="t"/>
                       <a:r>
-                        <a:rPr lang="en-IN" sz="1800" u="none" strike="noStrike">
+                        <a:rPr lang="en-IN" sz="1800" u="none" strike="noStrike" dirty="0">
                           <a:effectLst/>
                         </a:rPr>
                         <a:t>11-Aug-2024</a:t>
                       </a:r>
-                      <a:endParaRPr lang="en-IN" sz="1800" b="0" i="0" u="none" strike="noStrike">
+                      <a:endParaRPr lang="en-IN" sz="1800" b="0" i="0" u="none" strike="noStrike" dirty="0">
                         <a:solidFill>
                           <a:srgbClr val="000000"/>
                         </a:solidFill>
@@ -4020,7 +4025,7 @@
           <p:nvPr>
             <p:extLst>
               <p:ext uri="{D42A27DB-BD31-4B8C-83A1-F6EECF244321}">
-                <p14:modId xmlns:p14="http://schemas.microsoft.com/office/powerpoint/2010/main" val="495578321"/>
+                <p14:modId xmlns:p14="http://schemas.microsoft.com/office/powerpoint/2010/main" val="3105716833"/>
               </p:ext>
             </p:extLst>
           </p:nvPr>
@@ -4082,12 +4087,12 @@
                     <a:p>
                       <a:pPr algn="l" fontAlgn="t"/>
                       <a:r>
-                        <a:rPr lang="en-IN" sz="1800" u="none" strike="noStrike">
+                        <a:rPr lang="en-IN" sz="1800" u="none" strike="noStrike" dirty="0">
                           <a:effectLst/>
                         </a:rPr>
-                        <a:t> </a:t>
+                        <a:t> 31-Aug-2024</a:t>
                       </a:r>
-                      <a:endParaRPr lang="en-IN" sz="1800" b="0" i="0" u="none" strike="noStrike">
+                      <a:endParaRPr lang="en-IN" sz="1800" b="0" i="0" u="none" strike="noStrike" dirty="0">
                         <a:solidFill>
                           <a:srgbClr val="000000"/>
                         </a:solidFill>
@@ -4574,7 +4579,7 @@
                         <a:rPr lang="en-US" sz="1800" u="none" strike="noStrike" dirty="0">
                           <a:effectLst/>
                         </a:rPr>
-                        <a:t> Layer to identify free areas in the layout - In Progress</a:t>
+                        <a:t> Layer to identify free areas in the layout</a:t>
                       </a:r>
                       <a:endParaRPr lang="en-US" sz="1800" b="0" i="0" u="none" strike="noStrike" dirty="0">
                         <a:solidFill>

</xml_diff>